<commit_message>
Fix title of presentation
</commit_message>
<xml_diff>
--- a/Building SPAs in SharePoint Using AngularJS.pptx
+++ b/Building SPAs in SharePoint Using AngularJS.pptx
@@ -18684,7 +18684,19 @@
           <a:p>
             <a:r>
               <a:rPr lang="en-US" dirty="0"/>
-              <a:t>Building Single Page Applications in SharePoint using </a:t>
+              <a:t>Building </a:t>
+            </a:r>
+            <a:r>
+              <a:rPr lang="en-US" dirty="0" smtClean="0"/>
+              <a:t>SharePoint Single </a:t>
+            </a:r>
+            <a:r>
+              <a:rPr lang="en-US" dirty="0"/>
+              <a:t>Page </a:t>
+            </a:r>
+            <a:r>
+              <a:rPr lang="en-US" dirty="0" smtClean="0"/>
+              <a:t>Applications using </a:t>
             </a:r>
             <a:r>
               <a:rPr lang="en-US" dirty="0" smtClean="0"/>

</xml_diff>

<commit_message>
Update title of presentation.
</commit_message>
<xml_diff>
--- a/Building SPAs in SharePoint Using AngularJS.pptx
+++ b/Building SPAs in SharePoint Using AngularJS.pptx
@@ -23769,7 +23769,11 @@
           <a:p>
             <a:r>
               <a:rPr lang="en-US" dirty="0" smtClean="0"/>
-              <a:t>SharePoint 2013 REST</a:t>
+              <a:t>SharePoint 2013 </a:t>
+            </a:r>
+            <a:r>
+              <a:rPr lang="en-US" dirty="0" smtClean="0"/>
+              <a:t>REST API</a:t>
             </a:r>
             <a:endParaRPr lang="en-US" dirty="0"/>
           </a:p>
@@ -23798,100 +23802,100 @@
           <a:lstStyle/>
           <a:p>
             <a:r>
+              <a:rPr lang="en-US" sz="1800" dirty="0" smtClean="0"/>
+              <a:t>Use jQuery AJAX or AngularJS $http</a:t>
+            </a:r>
+          </a:p>
+          <a:p>
+            <a:r>
+              <a:rPr lang="en-US" sz="1800" dirty="0" smtClean="0"/>
+              <a:t>Options</a:t>
+            </a:r>
+          </a:p>
+          <a:p>
+            <a:pPr lvl="1"/>
+            <a:r>
               <a:rPr lang="en-US" sz="1600" dirty="0" smtClean="0"/>
-              <a:t>Use jQuery AJAX or AngularJS $http</a:t>
-            </a:r>
-          </a:p>
-          <a:p>
+              <a:t>$select</a:t>
+            </a:r>
+          </a:p>
+          <a:p>
+            <a:pPr lvl="1"/>
             <a:r>
               <a:rPr lang="en-US" sz="1600" dirty="0" smtClean="0"/>
-              <a:t>Options</a:t>
+              <a:t>$filter</a:t>
             </a:r>
           </a:p>
           <a:p>
             <a:pPr lvl="1"/>
             <a:r>
-              <a:rPr lang="en-US" sz="1400" dirty="0" smtClean="0"/>
-              <a:t>$select</a:t>
+              <a:rPr lang="en-US" sz="1600" dirty="0" smtClean="0"/>
+              <a:t>$top</a:t>
             </a:r>
           </a:p>
           <a:p>
             <a:pPr lvl="1"/>
             <a:r>
-              <a:rPr lang="en-US" sz="1400" dirty="0" smtClean="0"/>
-              <a:t>$filter</a:t>
+              <a:rPr lang="en-US" sz="1600" dirty="0" smtClean="0"/>
+              <a:t>$skip</a:t>
             </a:r>
           </a:p>
           <a:p>
             <a:pPr lvl="1"/>
             <a:r>
-              <a:rPr lang="en-US" sz="1400" dirty="0" smtClean="0"/>
-              <a:t>$top</a:t>
+              <a:rPr lang="en-US" sz="1600" dirty="0" smtClean="0"/>
+              <a:t>$orderBy</a:t>
             </a:r>
           </a:p>
           <a:p>
             <a:pPr lvl="1"/>
             <a:r>
-              <a:rPr lang="en-US" sz="1400" dirty="0" smtClean="0"/>
-              <a:t>$skip</a:t>
+              <a:rPr lang="en-US" sz="1600" dirty="0" smtClean="0"/>
+              <a:t>$expand</a:t>
+            </a:r>
+          </a:p>
+          <a:p>
+            <a:r>
+              <a:rPr lang="en-US" sz="1800" dirty="0" smtClean="0"/>
+              <a:t>Best practices</a:t>
             </a:r>
           </a:p>
           <a:p>
             <a:pPr lvl="1"/>
             <a:r>
-              <a:rPr lang="en-US" sz="1400" dirty="0" smtClean="0"/>
-              <a:t>$orderBy</a:t>
+              <a:rPr lang="en-US" sz="1600" dirty="0" smtClean="0"/>
+              <a:t>Use Postman or Fiddler to execute and test queries</a:t>
             </a:r>
           </a:p>
           <a:p>
             <a:pPr lvl="1"/>
             <a:r>
-              <a:rPr lang="en-US" sz="1400" dirty="0" smtClean="0"/>
-              <a:t>$expand</a:t>
-            </a:r>
-          </a:p>
-          <a:p>
-            <a:r>
               <a:rPr lang="en-US" sz="1600" dirty="0" smtClean="0"/>
-              <a:t>Best practices</a:t>
+              <a:t>Set the Accept header</a:t>
             </a:r>
           </a:p>
           <a:p>
             <a:pPr lvl="1"/>
             <a:r>
-              <a:rPr lang="en-US" sz="1400" dirty="0" smtClean="0"/>
-              <a:t>Use Postman or Fiddler to execute and test queries</a:t>
+              <a:rPr lang="en-US" sz="1600" dirty="0" smtClean="0"/>
+              <a:t>Only retrieve what you need by usin</a:t>
+            </a:r>
+            <a:r>
+              <a:rPr lang="en-US" sz="1600" dirty="0"/>
+              <a:t>g</a:t>
+            </a:r>
+            <a:r>
+              <a:rPr lang="en-US" sz="1600" dirty="0" smtClean="0"/>
+              <a:t> $select and $filter.</a:t>
             </a:r>
           </a:p>
           <a:p>
             <a:pPr lvl="1"/>
             <a:r>
-              <a:rPr lang="en-US" sz="1400" dirty="0" smtClean="0"/>
-              <a:t>Set the Accept header</a:t>
-            </a:r>
-          </a:p>
-          <a:p>
-            <a:pPr lvl="1"/>
-            <a:r>
-              <a:rPr lang="en-US" sz="1400" dirty="0" smtClean="0"/>
-              <a:t>Only retrieve what you need by usin</a:t>
-            </a:r>
-            <a:r>
-              <a:rPr lang="en-US" sz="1400" dirty="0"/>
-              <a:t>g</a:t>
-            </a:r>
-            <a:r>
-              <a:rPr lang="en-US" sz="1400" dirty="0" smtClean="0"/>
-              <a:t> $select and $filter.</a:t>
-            </a:r>
-          </a:p>
-          <a:p>
-            <a:pPr lvl="1"/>
-            <a:r>
-              <a:rPr lang="en-US" sz="1400" dirty="0" smtClean="0"/>
+              <a:rPr lang="en-US" sz="1600" dirty="0" smtClean="0"/>
               <a:t>“Chunky, not chatty”</a:t>
             </a:r>
-            <a:endParaRPr lang="en-US" sz="1400" dirty="0"/>
+            <a:endParaRPr lang="en-US" sz="1600" dirty="0"/>
           </a:p>
         </p:txBody>
       </p:sp>

</xml_diff>